<commit_message>
added all project files
</commit_message>
<xml_diff>
--- a/material/WorkProgress.pptx
+++ b/material/WorkProgress.pptx
@@ -6,6 +6,8 @@
   </p:sldMasterIdLst>
   <p:sldIdLst>
     <p:sldId id="256" r:id="rId2"/>
+    <p:sldId id="257" r:id="rId3"/>
+    <p:sldId id="258" r:id="rId4"/>
   </p:sldIdLst>
   <p:sldSz cx="12192000" cy="6858000"/>
   <p:notesSz cx="6858000" cy="9144000"/>
@@ -259,7 +261,7 @@
           <a:p>
             <a:fld id="{EE6845E6-6461-6C43-AE42-06CB0E4B301C}" type="datetimeFigureOut">
               <a:rPr lang="en-US" smtClean="0"/>
-              <a:t>2/22/22</a:t>
+              <a:t>4/25/22</a:t>
             </a:fld>
             <a:endParaRPr lang="en-US"/>
           </a:p>
@@ -457,7 +459,7 @@
           <a:p>
             <a:fld id="{EE6845E6-6461-6C43-AE42-06CB0E4B301C}" type="datetimeFigureOut">
               <a:rPr lang="en-US" smtClean="0"/>
-              <a:t>2/22/22</a:t>
+              <a:t>4/25/22</a:t>
             </a:fld>
             <a:endParaRPr lang="en-US"/>
           </a:p>
@@ -665,7 +667,7 @@
           <a:p>
             <a:fld id="{EE6845E6-6461-6C43-AE42-06CB0E4B301C}" type="datetimeFigureOut">
               <a:rPr lang="en-US" smtClean="0"/>
-              <a:t>2/22/22</a:t>
+              <a:t>4/25/22</a:t>
             </a:fld>
             <a:endParaRPr lang="en-US"/>
           </a:p>
@@ -863,7 +865,7 @@
           <a:p>
             <a:fld id="{EE6845E6-6461-6C43-AE42-06CB0E4B301C}" type="datetimeFigureOut">
               <a:rPr lang="en-US" smtClean="0"/>
-              <a:t>2/22/22</a:t>
+              <a:t>4/25/22</a:t>
             </a:fld>
             <a:endParaRPr lang="en-US"/>
           </a:p>
@@ -1138,7 +1140,7 @@
           <a:p>
             <a:fld id="{EE6845E6-6461-6C43-AE42-06CB0E4B301C}" type="datetimeFigureOut">
               <a:rPr lang="en-US" smtClean="0"/>
-              <a:t>2/22/22</a:t>
+              <a:t>4/25/22</a:t>
             </a:fld>
             <a:endParaRPr lang="en-US"/>
           </a:p>
@@ -1403,7 +1405,7 @@
           <a:p>
             <a:fld id="{EE6845E6-6461-6C43-AE42-06CB0E4B301C}" type="datetimeFigureOut">
               <a:rPr lang="en-US" smtClean="0"/>
-              <a:t>2/22/22</a:t>
+              <a:t>4/25/22</a:t>
             </a:fld>
             <a:endParaRPr lang="en-US"/>
           </a:p>
@@ -1815,7 +1817,7 @@
           <a:p>
             <a:fld id="{EE6845E6-6461-6C43-AE42-06CB0E4B301C}" type="datetimeFigureOut">
               <a:rPr lang="en-US" smtClean="0"/>
-              <a:t>2/22/22</a:t>
+              <a:t>4/25/22</a:t>
             </a:fld>
             <a:endParaRPr lang="en-US"/>
           </a:p>
@@ -1956,7 +1958,7 @@
           <a:p>
             <a:fld id="{EE6845E6-6461-6C43-AE42-06CB0E4B301C}" type="datetimeFigureOut">
               <a:rPr lang="en-US" smtClean="0"/>
-              <a:t>2/22/22</a:t>
+              <a:t>4/25/22</a:t>
             </a:fld>
             <a:endParaRPr lang="en-US"/>
           </a:p>
@@ -2069,7 +2071,7 @@
           <a:p>
             <a:fld id="{EE6845E6-6461-6C43-AE42-06CB0E4B301C}" type="datetimeFigureOut">
               <a:rPr lang="en-US" smtClean="0"/>
-              <a:t>2/22/22</a:t>
+              <a:t>4/25/22</a:t>
             </a:fld>
             <a:endParaRPr lang="en-US"/>
           </a:p>
@@ -2380,7 +2382,7 @@
           <a:p>
             <a:fld id="{EE6845E6-6461-6C43-AE42-06CB0E4B301C}" type="datetimeFigureOut">
               <a:rPr lang="en-US" smtClean="0"/>
-              <a:t>2/22/22</a:t>
+              <a:t>4/25/22</a:t>
             </a:fld>
             <a:endParaRPr lang="en-US"/>
           </a:p>
@@ -2668,7 +2670,7 @@
           <a:p>
             <a:fld id="{EE6845E6-6461-6C43-AE42-06CB0E4B301C}" type="datetimeFigureOut">
               <a:rPr lang="en-US" smtClean="0"/>
-              <a:t>2/22/22</a:t>
+              <a:t>4/25/22</a:t>
             </a:fld>
             <a:endParaRPr lang="en-US"/>
           </a:p>
@@ -2909,7 +2911,7 @@
           <a:p>
             <a:fld id="{EE6845E6-6461-6C43-AE42-06CB0E4B301C}" type="datetimeFigureOut">
               <a:rPr lang="en-US" smtClean="0"/>
-              <a:t>2/22/22</a:t>
+              <a:t>4/25/22</a:t>
             </a:fld>
             <a:endParaRPr lang="en-US"/>
           </a:p>
@@ -3328,10 +3330,10 @@
       </p:grpSpPr>
       <p:grpSp>
         <p:nvGrpSpPr>
-          <p:cNvPr id="106" name="Group 105">
-            <a:extLst>
-              <a:ext uri="{FF2B5EF4-FFF2-40B4-BE49-F238E27FC236}">
-                <a16:creationId xmlns:a16="http://schemas.microsoft.com/office/drawing/2014/main" id="{2AC3F4C3-75A6-FF4C-9A53-0B4ABCDC6398}"/>
+          <p:cNvPr id="12" name="Group 11">
+            <a:extLst>
+              <a:ext uri="{FF2B5EF4-FFF2-40B4-BE49-F238E27FC236}">
+                <a16:creationId xmlns:a16="http://schemas.microsoft.com/office/drawing/2014/main" id="{0DC6C1A0-F191-3C56-BC1B-7200B05516B3}"/>
               </a:ext>
             </a:extLst>
           </p:cNvPr>
@@ -3341,9 +3343,9 @@
         <p:grpSpPr>
           <a:xfrm>
             <a:off x="176659" y="889280"/>
-            <a:ext cx="8633511" cy="4893546"/>
+            <a:ext cx="8633511" cy="3729962"/>
             <a:chOff x="176659" y="889280"/>
-            <a:chExt cx="8633511" cy="4893546"/>
+            <a:chExt cx="8633511" cy="3729962"/>
           </a:xfrm>
         </p:grpSpPr>
         <p:sp>
@@ -3648,14 +3650,14 @@
             <p:cNvCxnSpPr>
               <a:cxnSpLocks/>
               <a:stCxn id="29" idx="3"/>
-              <a:endCxn id="42" idx="1"/>
+              <a:endCxn id="27" idx="1"/>
             </p:cNvCxnSpPr>
             <p:nvPr/>
           </p:nvCxnSpPr>
           <p:spPr>
             <a:xfrm>
               <a:off x="3778994" y="1380811"/>
-              <a:ext cx="458622" cy="1410121"/>
+              <a:ext cx="462940" cy="1388885"/>
             </a:xfrm>
             <a:prstGeom prst="line">
               <a:avLst/>
@@ -3689,14 +3691,14 @@
             <p:cNvCxnSpPr>
               <a:cxnSpLocks/>
               <a:stCxn id="37" idx="3"/>
-              <a:endCxn id="42" idx="1"/>
+              <a:endCxn id="36" idx="1"/>
             </p:cNvCxnSpPr>
             <p:nvPr/>
           </p:nvCxnSpPr>
           <p:spPr>
             <a:xfrm>
               <a:off x="3305069" y="2485296"/>
-              <a:ext cx="932547" cy="305636"/>
+              <a:ext cx="932547" cy="1530006"/>
             </a:xfrm>
             <a:prstGeom prst="line">
               <a:avLst/>
@@ -3730,14 +3732,14 @@
             <p:cNvCxnSpPr>
               <a:cxnSpLocks/>
               <a:stCxn id="38" idx="3"/>
-              <a:endCxn id="42" idx="1"/>
+              <a:endCxn id="36" idx="1"/>
             </p:cNvCxnSpPr>
             <p:nvPr/>
           </p:nvCxnSpPr>
           <p:spPr>
-            <a:xfrm flipV="1">
-              <a:off x="3305069" y="2790932"/>
-              <a:ext cx="932547" cy="615871"/>
+            <a:xfrm>
+              <a:off x="3305069" y="3406803"/>
+              <a:ext cx="932547" cy="608499"/>
             </a:xfrm>
             <a:prstGeom prst="line">
               <a:avLst/>
@@ -3745,94 +3747,6 @@
             <a:ln w="12700">
               <a:headEnd type="none"/>
             </a:ln>
-          </p:spPr>
-          <p:style>
-            <a:lnRef idx="1">
-              <a:schemeClr val="accent1"/>
-            </a:lnRef>
-            <a:fillRef idx="0">
-              <a:schemeClr val="accent1"/>
-            </a:fillRef>
-            <a:effectRef idx="0">
-              <a:schemeClr val="accent1"/>
-            </a:effectRef>
-            <a:fontRef idx="minor">
-              <a:schemeClr val="tx1"/>
-            </a:fontRef>
-          </p:style>
-        </p:cxnSp>
-        <p:sp>
-          <p:nvSpPr>
-            <p:cNvPr id="13" name="Rounded Rectangle 12">
-              <a:extLst>
-                <a:ext uri="{FF2B5EF4-FFF2-40B4-BE49-F238E27FC236}">
-                  <a16:creationId xmlns:a16="http://schemas.microsoft.com/office/drawing/2014/main" id="{E86D05F9-1363-1B47-8257-DA74D60B8166}"/>
-                </a:ext>
-              </a:extLst>
-            </p:cNvPr>
-            <p:cNvSpPr/>
-            <p:nvPr/>
-          </p:nvSpPr>
-          <p:spPr>
-            <a:xfrm>
-              <a:off x="4219600" y="5171552"/>
-              <a:ext cx="1641232" cy="611274"/>
-            </a:xfrm>
-            <a:prstGeom prst="roundRect">
-              <a:avLst/>
-            </a:prstGeom>
-          </p:spPr>
-          <p:style>
-            <a:lnRef idx="2">
-              <a:schemeClr val="accent6"/>
-            </a:lnRef>
-            <a:fillRef idx="1">
-              <a:schemeClr val="lt1"/>
-            </a:fillRef>
-            <a:effectRef idx="0">
-              <a:schemeClr val="accent6"/>
-            </a:effectRef>
-            <a:fontRef idx="minor">
-              <a:schemeClr val="dk1"/>
-            </a:fontRef>
-          </p:style>
-          <p:txBody>
-            <a:bodyPr rtlCol="0" anchor="ctr"/>
-            <a:lstStyle/>
-            <a:p>
-              <a:pPr algn="ctr"/>
-              <a:r>
-                <a:rPr lang="en-US" dirty="0"/>
-                <a:t>Cost Function</a:t>
-              </a:r>
-            </a:p>
-          </p:txBody>
-        </p:sp>
-        <p:cxnSp>
-          <p:nvCxnSpPr>
-            <p:cNvPr id="14" name="Straight Connector 13">
-              <a:extLst>
-                <a:ext uri="{FF2B5EF4-FFF2-40B4-BE49-F238E27FC236}">
-                  <a16:creationId xmlns:a16="http://schemas.microsoft.com/office/drawing/2014/main" id="{30958086-C7F2-564C-A6E3-D6FAEF29B8E3}"/>
-                </a:ext>
-              </a:extLst>
-            </p:cNvPr>
-            <p:cNvCxnSpPr>
-              <a:cxnSpLocks/>
-              <a:stCxn id="13" idx="0"/>
-              <a:endCxn id="36" idx="2"/>
-            </p:cNvCxnSpPr>
-            <p:nvPr/>
-          </p:nvCxnSpPr>
-          <p:spPr>
-            <a:xfrm flipV="1">
-              <a:off x="5040216" y="4619242"/>
-              <a:ext cx="18016" cy="552310"/>
-            </a:xfrm>
-            <a:prstGeom prst="line">
-              <a:avLst/>
-            </a:prstGeom>
-            <a:ln w="12700"/>
           </p:spPr>
           <p:style>
             <a:lnRef idx="1">
@@ -4039,53 +3953,6 @@
             </a:fontRef>
           </p:style>
         </p:cxnSp>
-        <p:sp>
-          <p:nvSpPr>
-            <p:cNvPr id="42" name="Rounded Rectangle 41">
-              <a:extLst>
-                <a:ext uri="{FF2B5EF4-FFF2-40B4-BE49-F238E27FC236}">
-                  <a16:creationId xmlns:a16="http://schemas.microsoft.com/office/drawing/2014/main" id="{52B2AEC9-37E7-6D4C-9E21-751B4889341A}"/>
-                </a:ext>
-              </a:extLst>
-            </p:cNvPr>
-            <p:cNvSpPr/>
-            <p:nvPr/>
-          </p:nvSpPr>
-          <p:spPr>
-            <a:xfrm>
-              <a:off x="4237616" y="2485295"/>
-              <a:ext cx="1641232" cy="611274"/>
-            </a:xfrm>
-            <a:prstGeom prst="roundRect">
-              <a:avLst/>
-            </a:prstGeom>
-          </p:spPr>
-          <p:style>
-            <a:lnRef idx="2">
-              <a:schemeClr val="accent6"/>
-            </a:lnRef>
-            <a:fillRef idx="1">
-              <a:schemeClr val="lt1"/>
-            </a:fillRef>
-            <a:effectRef idx="0">
-              <a:schemeClr val="accent6"/>
-            </a:effectRef>
-            <a:fontRef idx="minor">
-              <a:schemeClr val="dk1"/>
-            </a:fontRef>
-          </p:style>
-          <p:txBody>
-            <a:bodyPr rtlCol="0" anchor="ctr"/>
-            <a:lstStyle/>
-            <a:p>
-              <a:pPr algn="ctr"/>
-              <a:r>
-                <a:rPr lang="en-US" dirty="0"/>
-                <a:t>Discretization</a:t>
-              </a:r>
-            </a:p>
-          </p:txBody>
-        </p:sp>
         <p:cxnSp>
           <p:nvCxnSpPr>
             <p:cNvPr id="53" name="Straight Connector 52">
@@ -4097,15 +3964,15 @@
             </p:cNvPr>
             <p:cNvCxnSpPr>
               <a:cxnSpLocks/>
-              <a:stCxn id="42" idx="2"/>
+              <a:stCxn id="27" idx="2"/>
               <a:endCxn id="36" idx="0"/>
             </p:cNvCxnSpPr>
             <p:nvPr/>
           </p:nvCxnSpPr>
           <p:spPr>
-            <a:xfrm>
-              <a:off x="5058232" y="3096569"/>
-              <a:ext cx="0" cy="314792"/>
+            <a:xfrm flipH="1">
+              <a:off x="5058232" y="3075333"/>
+              <a:ext cx="4318" cy="336028"/>
             </a:xfrm>
             <a:prstGeom prst="line">
               <a:avLst/>
@@ -4170,11 +4037,1418 @@
             </a:fontRef>
           </p:style>
         </p:cxnSp>
+        <p:sp>
+          <p:nvSpPr>
+            <p:cNvPr id="27" name="Rounded Rectangle 26">
+              <a:extLst>
+                <a:ext uri="{FF2B5EF4-FFF2-40B4-BE49-F238E27FC236}">
+                  <a16:creationId xmlns:a16="http://schemas.microsoft.com/office/drawing/2014/main" id="{F026EF47-A979-8E5F-3E53-7EE29EA30721}"/>
+                </a:ext>
+              </a:extLst>
+            </p:cNvPr>
+            <p:cNvSpPr/>
+            <p:nvPr/>
+          </p:nvSpPr>
+          <p:spPr>
+            <a:xfrm>
+              <a:off x="4241934" y="2464059"/>
+              <a:ext cx="1641232" cy="611274"/>
+            </a:xfrm>
+            <a:prstGeom prst="roundRect">
+              <a:avLst/>
+            </a:prstGeom>
+          </p:spPr>
+          <p:style>
+            <a:lnRef idx="2">
+              <a:schemeClr val="accent6"/>
+            </a:lnRef>
+            <a:fillRef idx="1">
+              <a:schemeClr val="lt1"/>
+            </a:fillRef>
+            <a:effectRef idx="0">
+              <a:schemeClr val="accent6"/>
+            </a:effectRef>
+            <a:fontRef idx="minor">
+              <a:schemeClr val="dk1"/>
+            </a:fontRef>
+          </p:style>
+          <p:txBody>
+            <a:bodyPr rtlCol="0" anchor="ctr"/>
+            <a:lstStyle/>
+            <a:p>
+              <a:pPr algn="ctr"/>
+              <a:r>
+                <a:rPr lang="en-US" dirty="0"/>
+                <a:t>Cost Function</a:t>
+              </a:r>
+            </a:p>
+          </p:txBody>
+        </p:sp>
       </p:grpSp>
     </p:spTree>
     <p:extLst>
       <p:ext uri="{BB962C8B-B14F-4D97-AF65-F5344CB8AC3E}">
         <p14:creationId xmlns:p14="http://schemas.microsoft.com/office/powerpoint/2010/main" val="1509970913"/>
+      </p:ext>
+    </p:extLst>
+  </p:cSld>
+  <p:clrMapOvr>
+    <a:masterClrMapping/>
+  </p:clrMapOvr>
+</p:sld>
+</file>
+
+<file path=ppt/slides/slide2.xml><?xml version="1.0" encoding="utf-8"?>
+<p:sld xmlns:a="http://schemas.openxmlformats.org/drawingml/2006/main" xmlns:r="http://schemas.openxmlformats.org/officeDocument/2006/relationships" xmlns:p="http://schemas.openxmlformats.org/presentationml/2006/main">
+  <p:cSld>
+    <p:spTree>
+      <p:nvGrpSpPr>
+        <p:cNvPr id="1" name=""/>
+        <p:cNvGrpSpPr/>
+        <p:nvPr/>
+      </p:nvGrpSpPr>
+      <p:grpSpPr>
+        <a:xfrm>
+          <a:off x="0" y="0"/>
+          <a:ext cx="0" cy="0"/>
+          <a:chOff x="0" y="0"/>
+          <a:chExt cx="0" cy="0"/>
+        </a:xfrm>
+      </p:grpSpPr>
+      <p:grpSp>
+        <p:nvGrpSpPr>
+          <p:cNvPr id="20" name="Group 19">
+            <a:extLst>
+              <a:ext uri="{FF2B5EF4-FFF2-40B4-BE49-F238E27FC236}">
+                <a16:creationId xmlns:a16="http://schemas.microsoft.com/office/drawing/2014/main" id="{54B9EC2C-D86D-6408-8CC7-A47591BC0809}"/>
+              </a:ext>
+            </a:extLst>
+          </p:cNvPr>
+          <p:cNvGrpSpPr/>
+          <p:nvPr/>
+        </p:nvGrpSpPr>
+        <p:grpSpPr>
+          <a:xfrm>
+            <a:off x="2371725" y="1558949"/>
+            <a:ext cx="6110287" cy="1568948"/>
+            <a:chOff x="2371725" y="1558949"/>
+            <a:chExt cx="6110287" cy="1568948"/>
+          </a:xfrm>
+        </p:grpSpPr>
+        <p:sp>
+          <p:nvSpPr>
+            <p:cNvPr id="5" name="Rounded Rectangle 4">
+              <a:extLst>
+                <a:ext uri="{FF2B5EF4-FFF2-40B4-BE49-F238E27FC236}">
+                  <a16:creationId xmlns:a16="http://schemas.microsoft.com/office/drawing/2014/main" id="{4C4B985B-5D53-F491-7E39-13E6A0E7583F}"/>
+                </a:ext>
+              </a:extLst>
+            </p:cNvPr>
+            <p:cNvSpPr/>
+            <p:nvPr/>
+          </p:nvSpPr>
+          <p:spPr>
+            <a:xfrm>
+              <a:off x="2371725" y="1685925"/>
+              <a:ext cx="1843088" cy="1228717"/>
+            </a:xfrm>
+            <a:prstGeom prst="roundRect">
+              <a:avLst/>
+            </a:prstGeom>
+            <a:solidFill>
+              <a:schemeClr val="bg1"/>
+            </a:solidFill>
+            <a:ln w="38100">
+              <a:solidFill>
+                <a:schemeClr val="tx1"/>
+              </a:solidFill>
+            </a:ln>
+          </p:spPr>
+          <p:style>
+            <a:lnRef idx="2">
+              <a:schemeClr val="accent1">
+                <a:shade val="50000"/>
+              </a:schemeClr>
+            </a:lnRef>
+            <a:fillRef idx="1">
+              <a:schemeClr val="accent1"/>
+            </a:fillRef>
+            <a:effectRef idx="0">
+              <a:schemeClr val="accent1"/>
+            </a:effectRef>
+            <a:fontRef idx="minor">
+              <a:schemeClr val="lt1"/>
+            </a:fontRef>
+          </p:style>
+          <p:txBody>
+            <a:bodyPr rtlCol="0" anchor="ctr"/>
+            <a:lstStyle/>
+            <a:p>
+              <a:pPr algn="ctr"/>
+              <a:r>
+                <a:rPr lang="en-US" dirty="0" err="1">
+                  <a:solidFill>
+                    <a:schemeClr val="tx1"/>
+                  </a:solidFill>
+                </a:rPr>
+                <a:t>Beaglebone</a:t>
+              </a:r>
+              <a:r>
+                <a:rPr lang="en-US" dirty="0">
+                  <a:solidFill>
+                    <a:schemeClr val="tx1"/>
+                  </a:solidFill>
+                </a:rPr>
+                <a:t> Blue</a:t>
+              </a:r>
+            </a:p>
+          </p:txBody>
+        </p:sp>
+        <p:cxnSp>
+          <p:nvCxnSpPr>
+            <p:cNvPr id="9" name="Straight Arrow Connector 8">
+              <a:extLst>
+                <a:ext uri="{FF2B5EF4-FFF2-40B4-BE49-F238E27FC236}">
+                  <a16:creationId xmlns:a16="http://schemas.microsoft.com/office/drawing/2014/main" id="{670B5DFA-5860-72A1-1542-F6CCD92A2898}"/>
+                </a:ext>
+              </a:extLst>
+            </p:cNvPr>
+            <p:cNvCxnSpPr>
+              <a:cxnSpLocks/>
+            </p:cNvCxnSpPr>
+            <p:nvPr/>
+          </p:nvCxnSpPr>
+          <p:spPr>
+            <a:xfrm>
+              <a:off x="4214813" y="1985963"/>
+              <a:ext cx="2424111" cy="0"/>
+            </a:xfrm>
+            <a:prstGeom prst="straightConnector1">
+              <a:avLst/>
+            </a:prstGeom>
+            <a:ln w="38100">
+              <a:tailEnd type="triangle"/>
+            </a:ln>
+          </p:spPr>
+          <p:style>
+            <a:lnRef idx="1">
+              <a:schemeClr val="accent1"/>
+            </a:lnRef>
+            <a:fillRef idx="0">
+              <a:schemeClr val="accent1"/>
+            </a:fillRef>
+            <a:effectRef idx="0">
+              <a:schemeClr val="accent1"/>
+            </a:effectRef>
+            <a:fontRef idx="minor">
+              <a:schemeClr val="tx1"/>
+            </a:fontRef>
+          </p:style>
+        </p:cxnSp>
+        <p:sp>
+          <p:nvSpPr>
+            <p:cNvPr id="12" name="Rounded Rectangle 11">
+              <a:extLst>
+                <a:ext uri="{FF2B5EF4-FFF2-40B4-BE49-F238E27FC236}">
+                  <a16:creationId xmlns:a16="http://schemas.microsoft.com/office/drawing/2014/main" id="{DDEEE1D3-A431-DB7D-E4BB-80268987B764}"/>
+                </a:ext>
+              </a:extLst>
+            </p:cNvPr>
+            <p:cNvSpPr/>
+            <p:nvPr/>
+          </p:nvSpPr>
+          <p:spPr>
+            <a:xfrm>
+              <a:off x="6638924" y="1685924"/>
+              <a:ext cx="1843088" cy="1228721"/>
+            </a:xfrm>
+            <a:prstGeom prst="roundRect">
+              <a:avLst/>
+            </a:prstGeom>
+            <a:solidFill>
+              <a:schemeClr val="bg1"/>
+            </a:solidFill>
+            <a:ln w="38100">
+              <a:solidFill>
+                <a:schemeClr val="tx1"/>
+              </a:solidFill>
+            </a:ln>
+          </p:spPr>
+          <p:style>
+            <a:lnRef idx="2">
+              <a:schemeClr val="accent1">
+                <a:shade val="50000"/>
+              </a:schemeClr>
+            </a:lnRef>
+            <a:fillRef idx="1">
+              <a:schemeClr val="accent1"/>
+            </a:fillRef>
+            <a:effectRef idx="0">
+              <a:schemeClr val="accent1"/>
+            </a:effectRef>
+            <a:fontRef idx="minor">
+              <a:schemeClr val="lt1"/>
+            </a:fontRef>
+          </p:style>
+          <p:txBody>
+            <a:bodyPr rtlCol="0" anchor="ctr"/>
+            <a:lstStyle/>
+            <a:p>
+              <a:pPr algn="ctr"/>
+              <a:r>
+                <a:rPr lang="en-US" dirty="0" err="1">
+                  <a:solidFill>
+                    <a:schemeClr val="tx1"/>
+                  </a:solidFill>
+                </a:rPr>
+                <a:t>Rasberry</a:t>
+              </a:r>
+              <a:r>
+                <a:rPr lang="en-US" dirty="0">
+                  <a:solidFill>
+                    <a:schemeClr val="tx1"/>
+                  </a:solidFill>
+                </a:rPr>
+                <a:t> Pi</a:t>
+              </a:r>
+            </a:p>
+          </p:txBody>
+        </p:sp>
+        <p:sp>
+          <p:nvSpPr>
+            <p:cNvPr id="13" name="TextBox 12">
+              <a:extLst>
+                <a:ext uri="{FF2B5EF4-FFF2-40B4-BE49-F238E27FC236}">
+                  <a16:creationId xmlns:a16="http://schemas.microsoft.com/office/drawing/2014/main" id="{B8FAEA10-9C34-8328-B503-3B6A85681EF0}"/>
+                </a:ext>
+              </a:extLst>
+            </p:cNvPr>
+            <p:cNvSpPr txBox="1"/>
+            <p:nvPr/>
+          </p:nvSpPr>
+          <p:spPr>
+            <a:xfrm>
+              <a:off x="4886325" y="2129916"/>
+              <a:ext cx="1109662" cy="369332"/>
+            </a:xfrm>
+            <a:prstGeom prst="rect">
+              <a:avLst/>
+            </a:prstGeom>
+            <a:noFill/>
+          </p:spPr>
+          <p:txBody>
+            <a:bodyPr wrap="square" rtlCol="0">
+              <a:spAutoFit/>
+            </a:bodyPr>
+            <a:lstStyle/>
+            <a:p>
+              <a:pPr algn="ctr"/>
+              <a:r>
+                <a:rPr lang="en-US" dirty="0"/>
+                <a:t>LCM</a:t>
+              </a:r>
+            </a:p>
+          </p:txBody>
+        </p:sp>
+        <p:cxnSp>
+          <p:nvCxnSpPr>
+            <p:cNvPr id="14" name="Straight Arrow Connector 13">
+              <a:extLst>
+                <a:ext uri="{FF2B5EF4-FFF2-40B4-BE49-F238E27FC236}">
+                  <a16:creationId xmlns:a16="http://schemas.microsoft.com/office/drawing/2014/main" id="{03043386-FBB8-429E-FC48-B93C8222F744}"/>
+                </a:ext>
+              </a:extLst>
+            </p:cNvPr>
+            <p:cNvCxnSpPr>
+              <a:cxnSpLocks/>
+            </p:cNvCxnSpPr>
+            <p:nvPr/>
+          </p:nvCxnSpPr>
+          <p:spPr>
+            <a:xfrm flipH="1">
+              <a:off x="4214812" y="2614613"/>
+              <a:ext cx="2424111" cy="0"/>
+            </a:xfrm>
+            <a:prstGeom prst="straightConnector1">
+              <a:avLst/>
+            </a:prstGeom>
+            <a:ln w="38100">
+              <a:tailEnd type="triangle"/>
+            </a:ln>
+          </p:spPr>
+          <p:style>
+            <a:lnRef idx="1">
+              <a:schemeClr val="accent1"/>
+            </a:lnRef>
+            <a:fillRef idx="0">
+              <a:schemeClr val="accent1"/>
+            </a:fillRef>
+            <a:effectRef idx="0">
+              <a:schemeClr val="accent1"/>
+            </a:effectRef>
+            <a:fontRef idx="minor">
+              <a:schemeClr val="tx1"/>
+            </a:fontRef>
+          </p:style>
+        </p:cxnSp>
+        <p:sp>
+          <p:nvSpPr>
+            <p:cNvPr id="18" name="TextBox 17">
+              <a:extLst>
+                <a:ext uri="{FF2B5EF4-FFF2-40B4-BE49-F238E27FC236}">
+                  <a16:creationId xmlns:a16="http://schemas.microsoft.com/office/drawing/2014/main" id="{81ED4B04-EF0D-9124-32F5-2B6BF8AE6A10}"/>
+                </a:ext>
+              </a:extLst>
+            </p:cNvPr>
+            <p:cNvSpPr txBox="1"/>
+            <p:nvPr/>
+          </p:nvSpPr>
+          <p:spPr>
+            <a:xfrm>
+              <a:off x="4886325" y="1558949"/>
+              <a:ext cx="1109662" cy="369332"/>
+            </a:xfrm>
+            <a:prstGeom prst="rect">
+              <a:avLst/>
+            </a:prstGeom>
+            <a:noFill/>
+          </p:spPr>
+          <p:txBody>
+            <a:bodyPr wrap="square" rtlCol="0">
+              <a:spAutoFit/>
+            </a:bodyPr>
+            <a:lstStyle/>
+            <a:p>
+              <a:pPr algn="ctr"/>
+              <a:r>
+                <a:rPr lang="en-US" dirty="0"/>
+                <a:t>Altitude</a:t>
+              </a:r>
+            </a:p>
+          </p:txBody>
+        </p:sp>
+        <p:sp>
+          <p:nvSpPr>
+            <p:cNvPr id="19" name="TextBox 18">
+              <a:extLst>
+                <a:ext uri="{FF2B5EF4-FFF2-40B4-BE49-F238E27FC236}">
+                  <a16:creationId xmlns:a16="http://schemas.microsoft.com/office/drawing/2014/main" id="{DDFAA315-E37B-CECC-4233-AB466311D6E4}"/>
+                </a:ext>
+              </a:extLst>
+            </p:cNvPr>
+            <p:cNvSpPr txBox="1"/>
+            <p:nvPr/>
+          </p:nvSpPr>
+          <p:spPr>
+            <a:xfrm>
+              <a:off x="4748210" y="2758565"/>
+              <a:ext cx="1357313" cy="369332"/>
+            </a:xfrm>
+            <a:prstGeom prst="rect">
+              <a:avLst/>
+            </a:prstGeom>
+            <a:noFill/>
+          </p:spPr>
+          <p:txBody>
+            <a:bodyPr wrap="square" rtlCol="0">
+              <a:spAutoFit/>
+            </a:bodyPr>
+            <a:lstStyle/>
+            <a:p>
+              <a:pPr algn="ctr"/>
+              <a:r>
+                <a:rPr lang="en-US" dirty="0"/>
+                <a:t>Timestamp</a:t>
+              </a:r>
+            </a:p>
+          </p:txBody>
+        </p:sp>
+      </p:grpSp>
+      <p:pic>
+        <p:nvPicPr>
+          <p:cNvPr id="1026" name="Picture 2">
+            <a:extLst>
+              <a:ext uri="{FF2B5EF4-FFF2-40B4-BE49-F238E27FC236}">
+                <a16:creationId xmlns:a16="http://schemas.microsoft.com/office/drawing/2014/main" id="{FF98DEF2-20E8-BA51-4926-6D4B2588308C}"/>
+              </a:ext>
+            </a:extLst>
+          </p:cNvPr>
+          <p:cNvPicPr>
+            <a:picLocks noChangeAspect="1" noChangeArrowheads="1"/>
+          </p:cNvPicPr>
+          <p:nvPr/>
+        </p:nvPicPr>
+        <p:blipFill>
+          <a:blip r:embed="rId2">
+            <a:extLst>
+              <a:ext uri="{28A0092B-C50C-407E-A947-70E740481C1C}">
+                <a14:useLocalDpi xmlns:a14="http://schemas.microsoft.com/office/drawing/2010/main" val="0"/>
+              </a:ext>
+            </a:extLst>
+          </a:blip>
+          <a:srcRect/>
+          <a:stretch>
+            <a:fillRect/>
+          </a:stretch>
+        </p:blipFill>
+        <p:spPr bwMode="auto">
+          <a:xfrm>
+            <a:off x="228600" y="1047750"/>
+            <a:ext cx="11734800" cy="4762500"/>
+          </a:xfrm>
+          <a:prstGeom prst="rect">
+            <a:avLst/>
+          </a:prstGeom>
+          <a:noFill/>
+          <a:extLst>
+            <a:ext uri="{909E8E84-426E-40DD-AFC4-6F175D3DCCD1}">
+              <a14:hiddenFill xmlns:a14="http://schemas.microsoft.com/office/drawing/2010/main">
+                <a:solidFill>
+                  <a:srgbClr val="FFFFFF"/>
+                </a:solidFill>
+              </a14:hiddenFill>
+            </a:ext>
+          </a:extLst>
+        </p:spPr>
+      </p:pic>
+    </p:spTree>
+    <p:extLst>
+      <p:ext uri="{BB962C8B-B14F-4D97-AF65-F5344CB8AC3E}">
+        <p14:creationId xmlns:p14="http://schemas.microsoft.com/office/powerpoint/2010/main" val="88575369"/>
+      </p:ext>
+    </p:extLst>
+  </p:cSld>
+  <p:clrMapOvr>
+    <a:masterClrMapping/>
+  </p:clrMapOvr>
+</p:sld>
+</file>
+
+<file path=ppt/slides/slide3.xml><?xml version="1.0" encoding="utf-8"?>
+<p:sld xmlns:a="http://schemas.openxmlformats.org/drawingml/2006/main" xmlns:r="http://schemas.openxmlformats.org/officeDocument/2006/relationships" xmlns:p="http://schemas.openxmlformats.org/presentationml/2006/main">
+  <p:cSld>
+    <p:spTree>
+      <p:nvGrpSpPr>
+        <p:cNvPr id="1" name=""/>
+        <p:cNvGrpSpPr/>
+        <p:nvPr/>
+      </p:nvGrpSpPr>
+      <p:grpSpPr>
+        <a:xfrm>
+          <a:off x="0" y="0"/>
+          <a:ext cx="0" cy="0"/>
+          <a:chOff x="0" y="0"/>
+          <a:chExt cx="0" cy="0"/>
+        </a:xfrm>
+      </p:grpSpPr>
+      <p:grpSp>
+        <p:nvGrpSpPr>
+          <p:cNvPr id="110" name="Group 109">
+            <a:extLst>
+              <a:ext uri="{FF2B5EF4-FFF2-40B4-BE49-F238E27FC236}">
+                <a16:creationId xmlns:a16="http://schemas.microsoft.com/office/drawing/2014/main" id="{87D8B70E-4054-4080-B85E-9DD393D9F2EF}"/>
+              </a:ext>
+            </a:extLst>
+          </p:cNvPr>
+          <p:cNvGrpSpPr/>
+          <p:nvPr/>
+        </p:nvGrpSpPr>
+        <p:grpSpPr>
+          <a:xfrm>
+            <a:off x="667657" y="351973"/>
+            <a:ext cx="11278734" cy="5244116"/>
+            <a:chOff x="667657" y="351973"/>
+            <a:chExt cx="11278734" cy="5244116"/>
+          </a:xfrm>
+        </p:grpSpPr>
+        <p:sp>
+          <p:nvSpPr>
+            <p:cNvPr id="66" name="Rounded Rectangle 65">
+              <a:extLst>
+                <a:ext uri="{FF2B5EF4-FFF2-40B4-BE49-F238E27FC236}">
+                  <a16:creationId xmlns:a16="http://schemas.microsoft.com/office/drawing/2014/main" id="{85010C60-C52E-0443-8353-F2E880F13D83}"/>
+                </a:ext>
+              </a:extLst>
+            </p:cNvPr>
+            <p:cNvSpPr/>
+            <p:nvPr/>
+          </p:nvSpPr>
+          <p:spPr>
+            <a:xfrm>
+              <a:off x="3469706" y="351973"/>
+              <a:ext cx="5516168" cy="5244116"/>
+            </a:xfrm>
+            <a:prstGeom prst="roundRect">
+              <a:avLst/>
+            </a:prstGeom>
+            <a:ln w="38100">
+              <a:solidFill>
+                <a:schemeClr val="tx1"/>
+              </a:solidFill>
+            </a:ln>
+          </p:spPr>
+          <p:style>
+            <a:lnRef idx="2">
+              <a:schemeClr val="accent6"/>
+            </a:lnRef>
+            <a:fillRef idx="1">
+              <a:schemeClr val="lt1"/>
+            </a:fillRef>
+            <a:effectRef idx="0">
+              <a:schemeClr val="accent6"/>
+            </a:effectRef>
+            <a:fontRef idx="minor">
+              <a:schemeClr val="dk1"/>
+            </a:fontRef>
+          </p:style>
+          <p:txBody>
+            <a:bodyPr rtlCol="0" anchor="ctr"/>
+            <a:lstStyle/>
+            <a:p>
+              <a:pPr algn="ctr"/>
+              <a:endParaRPr lang="en-US">
+                <a:solidFill>
+                  <a:schemeClr val="tx1"/>
+                </a:solidFill>
+              </a:endParaRPr>
+            </a:p>
+          </p:txBody>
+        </p:sp>
+        <mc:AlternateContent xmlns:mc="http://schemas.openxmlformats.org/markup-compatibility/2006" xmlns:a14="http://schemas.microsoft.com/office/drawing/2010/main">
+          <mc:Choice Requires="a14">
+            <p:sp>
+              <p:nvSpPr>
+                <p:cNvPr id="45" name="Rounded Rectangle 44">
+                  <a:extLst>
+                    <a:ext uri="{FF2B5EF4-FFF2-40B4-BE49-F238E27FC236}">
+                      <a16:creationId xmlns:a16="http://schemas.microsoft.com/office/drawing/2014/main" id="{00DC52A9-4354-0B17-12CC-6101FFCAE36A}"/>
+                    </a:ext>
+                  </a:extLst>
+                </p:cNvPr>
+                <p:cNvSpPr/>
+                <p:nvPr/>
+              </p:nvSpPr>
+              <p:spPr>
+                <a:xfrm>
+                  <a:off x="9274628" y="676022"/>
+                  <a:ext cx="2671763" cy="1228721"/>
+                </a:xfrm>
+                <a:prstGeom prst="roundRect">
+                  <a:avLst/>
+                </a:prstGeom>
+                <a:solidFill>
+                  <a:schemeClr val="bg1"/>
+                </a:solidFill>
+                <a:ln w="38100">
+                  <a:solidFill>
+                    <a:schemeClr val="tx1"/>
+                  </a:solidFill>
+                </a:ln>
+              </p:spPr>
+              <p:style>
+                <a:lnRef idx="2">
+                  <a:schemeClr val="accent1">
+                    <a:shade val="50000"/>
+                  </a:schemeClr>
+                </a:lnRef>
+                <a:fillRef idx="1">
+                  <a:schemeClr val="accent1"/>
+                </a:fillRef>
+                <a:effectRef idx="0">
+                  <a:schemeClr val="accent1"/>
+                </a:effectRef>
+                <a:fontRef idx="minor">
+                  <a:schemeClr val="lt1"/>
+                </a:fontRef>
+              </p:style>
+              <p:txBody>
+                <a:bodyPr rtlCol="0" anchor="ctr"/>
+                <a:lstStyle/>
+                <a:p>
+                  <a:pPr algn="ctr"/>
+                  <a:r>
+                    <a:rPr lang="en-US" sz="2000" dirty="0">
+                      <a:solidFill>
+                        <a:srgbClr val="FF0000"/>
+                      </a:solidFill>
+                    </a:rPr>
+                    <a:t>Arducam</a:t>
+                  </a:r>
+                </a:p>
+                <a:p>
+                  <a:pPr algn="ctr"/>
+                  <a:r>
+                    <a:rPr lang="en-US" sz="1600" dirty="0">
+                      <a:solidFill>
+                        <a:schemeClr val="tx1"/>
+                      </a:solidFill>
+                    </a:rPr>
+                    <a:t>90</a:t>
+                  </a:r>
+                  <a14:m>
+                    <m:oMath xmlns:m="http://schemas.openxmlformats.org/officeDocument/2006/math">
+                      <m:r>
+                        <a:rPr lang="en-US" sz="1600" i="1" smtClean="0">
+                          <a:solidFill>
+                            <a:schemeClr val="tx1"/>
+                          </a:solidFill>
+                          <a:latin typeface="Cambria Math" panose="02040503050406030204" pitchFamily="18" charset="0"/>
+                          <a:ea typeface="Cambria Math" panose="02040503050406030204" pitchFamily="18" charset="0"/>
+                        </a:rPr>
+                        <m:t>°</m:t>
+                      </m:r>
+                    </m:oMath>
+                  </a14:m>
+                  <a:r>
+                    <a:rPr lang="en-US" sz="1600" dirty="0">
+                      <a:solidFill>
+                        <a:schemeClr val="tx1"/>
+                      </a:solidFill>
+                    </a:rPr>
+                    <a:t> FOV</a:t>
+                  </a:r>
+                </a:p>
+                <a:p>
+                  <a:pPr algn="ctr"/>
+                  <a:r>
+                    <a:rPr lang="en-US" sz="1600" dirty="0">
+                      <a:solidFill>
+                        <a:schemeClr val="tx1"/>
+                      </a:solidFill>
+                    </a:rPr>
+                    <a:t>640 x 480 @ 60 Hz</a:t>
+                  </a:r>
+                </a:p>
+                <a:p>
+                  <a:pPr algn="ctr"/>
+                  <a:r>
+                    <a:rPr lang="en-US" sz="1600" dirty="0">
+                      <a:solidFill>
+                        <a:schemeClr val="tx1"/>
+                      </a:solidFill>
+                    </a:rPr>
+                    <a:t>Black &amp; White Video Stream </a:t>
+                  </a:r>
+                </a:p>
+              </p:txBody>
+            </p:sp>
+          </mc:Choice>
+          <mc:Fallback xmlns="">
+            <p:sp>
+              <p:nvSpPr>
+                <p:cNvPr id="45" name="Rounded Rectangle 44">
+                  <a:extLst>
+                    <a:ext uri="{FF2B5EF4-FFF2-40B4-BE49-F238E27FC236}">
+                      <a16:creationId xmlns:a16="http://schemas.microsoft.com/office/drawing/2014/main" id="{00DC52A9-4354-0B17-12CC-6101FFCAE36A}"/>
+                    </a:ext>
+                  </a:extLst>
+                </p:cNvPr>
+                <p:cNvSpPr>
+                  <a:spLocks noRot="1" noChangeAspect="1" noMove="1" noResize="1" noEditPoints="1" noAdjustHandles="1" noChangeArrowheads="1" noChangeShapeType="1" noTextEdit="1"/>
+                </p:cNvSpPr>
+                <p:nvPr/>
+              </p:nvSpPr>
+              <p:spPr>
+                <a:xfrm>
+                  <a:off x="9274628" y="676022"/>
+                  <a:ext cx="2671763" cy="1228721"/>
+                </a:xfrm>
+                <a:prstGeom prst="roundRect">
+                  <a:avLst/>
+                </a:prstGeom>
+                <a:blipFill>
+                  <a:blip r:embed="rId2"/>
+                  <a:stretch>
+                    <a:fillRect/>
+                  </a:stretch>
+                </a:blipFill>
+                <a:ln w="38100">
+                  <a:solidFill>
+                    <a:schemeClr val="tx1"/>
+                  </a:solidFill>
+                </a:ln>
+              </p:spPr>
+              <p:txBody>
+                <a:bodyPr/>
+                <a:lstStyle/>
+                <a:p>
+                  <a:r>
+                    <a:rPr lang="en-US">
+                      <a:noFill/>
+                    </a:rPr>
+                    <a:t> </a:t>
+                  </a:r>
+                </a:p>
+              </p:txBody>
+            </p:sp>
+          </mc:Fallback>
+        </mc:AlternateContent>
+        <p:sp>
+          <p:nvSpPr>
+            <p:cNvPr id="21" name="Rounded Rectangle 20">
+              <a:extLst>
+                <a:ext uri="{FF2B5EF4-FFF2-40B4-BE49-F238E27FC236}">
+                  <a16:creationId xmlns:a16="http://schemas.microsoft.com/office/drawing/2014/main" id="{CCFBF5DC-EE8D-93B3-B3B3-8454922CE307}"/>
+                </a:ext>
+              </a:extLst>
+            </p:cNvPr>
+            <p:cNvSpPr/>
+            <p:nvPr/>
+          </p:nvSpPr>
+          <p:spPr>
+            <a:xfrm>
+              <a:off x="5617030" y="676022"/>
+              <a:ext cx="3012680" cy="1228721"/>
+            </a:xfrm>
+            <a:prstGeom prst="roundRect">
+              <a:avLst/>
+            </a:prstGeom>
+            <a:solidFill>
+              <a:schemeClr val="bg1"/>
+            </a:solidFill>
+            <a:ln w="38100">
+              <a:solidFill>
+                <a:schemeClr val="tx1"/>
+              </a:solidFill>
+            </a:ln>
+          </p:spPr>
+          <p:style>
+            <a:lnRef idx="2">
+              <a:schemeClr val="accent1">
+                <a:shade val="50000"/>
+              </a:schemeClr>
+            </a:lnRef>
+            <a:fillRef idx="1">
+              <a:schemeClr val="accent1"/>
+            </a:fillRef>
+            <a:effectRef idx="0">
+              <a:schemeClr val="accent1"/>
+            </a:effectRef>
+            <a:fontRef idx="minor">
+              <a:schemeClr val="lt1"/>
+            </a:fontRef>
+          </p:style>
+          <p:txBody>
+            <a:bodyPr rtlCol="0" anchor="ctr"/>
+            <a:lstStyle/>
+            <a:p>
+              <a:pPr algn="ctr"/>
+              <a:r>
+                <a:rPr lang="en-US" sz="2000" dirty="0">
+                  <a:solidFill>
+                    <a:srgbClr val="FF0000"/>
+                  </a:solidFill>
+                </a:rPr>
+                <a:t>Video Stream OpenCV</a:t>
+              </a:r>
+            </a:p>
+            <a:p>
+              <a:pPr algn="ctr"/>
+              <a:r>
+                <a:rPr lang="en-US" sz="1600" dirty="0">
+                  <a:solidFill>
+                    <a:schemeClr val="tx1"/>
+                  </a:solidFill>
+                </a:rPr>
+                <a:t>reads video input and publishes the video stream to a ROS topic /camera/</a:t>
+              </a:r>
+              <a:r>
+                <a:rPr lang="en-US" sz="1600" dirty="0" err="1">
+                  <a:solidFill>
+                    <a:schemeClr val="tx1"/>
+                  </a:solidFill>
+                </a:rPr>
+                <a:t>image_raw</a:t>
+              </a:r>
+              <a:endParaRPr lang="en-US" sz="1600" dirty="0">
+                <a:solidFill>
+                  <a:schemeClr val="tx1"/>
+                </a:solidFill>
+              </a:endParaRPr>
+            </a:p>
+          </p:txBody>
+        </p:sp>
+        <p:sp>
+          <p:nvSpPr>
+            <p:cNvPr id="30" name="Rounded Rectangle 29">
+              <a:extLst>
+                <a:ext uri="{FF2B5EF4-FFF2-40B4-BE49-F238E27FC236}">
+                  <a16:creationId xmlns:a16="http://schemas.microsoft.com/office/drawing/2014/main" id="{2B67DDCB-812A-683F-11D7-21EF41ADB8EA}"/>
+                </a:ext>
+              </a:extLst>
+            </p:cNvPr>
+            <p:cNvSpPr/>
+            <p:nvPr/>
+          </p:nvSpPr>
+          <p:spPr>
+            <a:xfrm>
+              <a:off x="4152247" y="2450928"/>
+              <a:ext cx="4151086" cy="1594005"/>
+            </a:xfrm>
+            <a:prstGeom prst="roundRect">
+              <a:avLst/>
+            </a:prstGeom>
+            <a:solidFill>
+              <a:schemeClr val="bg1"/>
+            </a:solidFill>
+            <a:ln w="38100">
+              <a:solidFill>
+                <a:schemeClr val="tx1"/>
+              </a:solidFill>
+            </a:ln>
+          </p:spPr>
+          <p:style>
+            <a:lnRef idx="2">
+              <a:schemeClr val="accent1">
+                <a:shade val="50000"/>
+              </a:schemeClr>
+            </a:lnRef>
+            <a:fillRef idx="1">
+              <a:schemeClr val="accent1"/>
+            </a:fillRef>
+            <a:effectRef idx="0">
+              <a:schemeClr val="accent1"/>
+            </a:effectRef>
+            <a:fontRef idx="minor">
+              <a:schemeClr val="lt1"/>
+            </a:fontRef>
+          </p:style>
+          <p:txBody>
+            <a:bodyPr rtlCol="0" anchor="ctr"/>
+            <a:lstStyle/>
+            <a:p>
+              <a:pPr algn="ctr"/>
+              <a:r>
+                <a:rPr lang="en-US" sz="2000" dirty="0">
+                  <a:solidFill>
+                    <a:srgbClr val="FF0000"/>
+                  </a:solidFill>
+                </a:rPr>
+                <a:t>SVO (Fast)</a:t>
+              </a:r>
+            </a:p>
+            <a:p>
+              <a:pPr algn="ctr"/>
+              <a:r>
+                <a:rPr lang="en-US" sz="1600" dirty="0">
+                  <a:solidFill>
+                    <a:schemeClr val="tx1"/>
+                  </a:solidFill>
+                </a:rPr>
+                <a:t>subscribes to topic /camera/</a:t>
+              </a:r>
+              <a:r>
+                <a:rPr lang="en-US" sz="1600" dirty="0" err="1">
+                  <a:solidFill>
+                    <a:schemeClr val="tx1"/>
+                  </a:solidFill>
+                </a:rPr>
+                <a:t>image_raw</a:t>
+              </a:r>
+              <a:endParaRPr lang="en-US" sz="1600" dirty="0">
+                <a:solidFill>
+                  <a:schemeClr val="tx1"/>
+                </a:solidFill>
+              </a:endParaRPr>
+            </a:p>
+            <a:p>
+              <a:pPr algn="ctr"/>
+              <a:r>
+                <a:rPr lang="en-US" sz="1600" dirty="0">
+                  <a:solidFill>
+                    <a:schemeClr val="tx1"/>
+                  </a:solidFill>
+                </a:rPr>
+                <a:t>Reads  altitude data for initialization from .txt </a:t>
+              </a:r>
+            </a:p>
+            <a:p>
+              <a:pPr algn="ctr"/>
+              <a:r>
+                <a:rPr lang="en-US" sz="1600" dirty="0">
+                  <a:solidFill>
+                    <a:schemeClr val="tx1"/>
+                  </a:solidFill>
+                </a:rPr>
+                <a:t>Publishes to pose data to topic /</a:t>
+              </a:r>
+              <a:r>
+                <a:rPr lang="en-US" sz="1600" dirty="0" err="1">
+                  <a:solidFill>
+                    <a:schemeClr val="tx1"/>
+                  </a:solidFill>
+                </a:rPr>
+                <a:t>svo_ros</a:t>
+              </a:r>
+              <a:r>
+                <a:rPr lang="en-US" sz="1600" dirty="0">
+                  <a:solidFill>
+                    <a:schemeClr val="tx1"/>
+                  </a:solidFill>
+                </a:rPr>
+                <a:t>/pose</a:t>
+              </a:r>
+            </a:p>
+          </p:txBody>
+        </p:sp>
+        <p:sp>
+          <p:nvSpPr>
+            <p:cNvPr id="47" name="TextBox 46">
+              <a:extLst>
+                <a:ext uri="{FF2B5EF4-FFF2-40B4-BE49-F238E27FC236}">
+                  <a16:creationId xmlns:a16="http://schemas.microsoft.com/office/drawing/2014/main" id="{5058E9CC-7FD9-DD6B-1185-7D98A81F5BED}"/>
+                </a:ext>
+              </a:extLst>
+            </p:cNvPr>
+            <p:cNvSpPr txBox="1"/>
+            <p:nvPr/>
+          </p:nvSpPr>
+          <p:spPr>
+            <a:xfrm>
+              <a:off x="4818824" y="4749862"/>
+              <a:ext cx="2817931" cy="584775"/>
+            </a:xfrm>
+            <a:prstGeom prst="rect">
+              <a:avLst/>
+            </a:prstGeom>
+            <a:noFill/>
+          </p:spPr>
+          <p:txBody>
+            <a:bodyPr wrap="square" rtlCol="0">
+              <a:spAutoFit/>
+            </a:bodyPr>
+            <a:lstStyle/>
+            <a:p>
+              <a:pPr algn="ctr"/>
+              <a:r>
+                <a:rPr lang="en-US" sz="3200" dirty="0" err="1"/>
+                <a:t>Rasberry</a:t>
+              </a:r>
+              <a:r>
+                <a:rPr lang="en-US" sz="3200" dirty="0"/>
+                <a:t> Pi</a:t>
+              </a:r>
+            </a:p>
+          </p:txBody>
+        </p:sp>
+        <p:cxnSp>
+          <p:nvCxnSpPr>
+            <p:cNvPr id="15" name="Straight Arrow Connector 14">
+              <a:extLst>
+                <a:ext uri="{FF2B5EF4-FFF2-40B4-BE49-F238E27FC236}">
+                  <a16:creationId xmlns:a16="http://schemas.microsoft.com/office/drawing/2014/main" id="{02A2B243-6BF7-808E-6B11-8D9A07B22B81}"/>
+                </a:ext>
+              </a:extLst>
+            </p:cNvPr>
+            <p:cNvCxnSpPr>
+              <a:cxnSpLocks/>
+              <a:stCxn id="45" idx="1"/>
+              <a:endCxn id="21" idx="3"/>
+            </p:cNvCxnSpPr>
+            <p:nvPr/>
+          </p:nvCxnSpPr>
+          <p:spPr>
+            <a:xfrm flipH="1">
+              <a:off x="8629710" y="1290383"/>
+              <a:ext cx="644918" cy="0"/>
+            </a:xfrm>
+            <a:prstGeom prst="straightConnector1">
+              <a:avLst/>
+            </a:prstGeom>
+            <a:ln w="38100">
+              <a:tailEnd type="triangle"/>
+            </a:ln>
+          </p:spPr>
+          <p:style>
+            <a:lnRef idx="1">
+              <a:schemeClr val="accent1"/>
+            </a:lnRef>
+            <a:fillRef idx="0">
+              <a:schemeClr val="accent1"/>
+            </a:fillRef>
+            <a:effectRef idx="0">
+              <a:schemeClr val="accent1"/>
+            </a:effectRef>
+            <a:fontRef idx="minor">
+              <a:schemeClr val="tx1"/>
+            </a:fontRef>
+          </p:style>
+        </p:cxnSp>
+        <p:cxnSp>
+          <p:nvCxnSpPr>
+            <p:cNvPr id="53" name="Straight Arrow Connector 52">
+              <a:extLst>
+                <a:ext uri="{FF2B5EF4-FFF2-40B4-BE49-F238E27FC236}">
+                  <a16:creationId xmlns:a16="http://schemas.microsoft.com/office/drawing/2014/main" id="{E0B33E32-AD80-C0C9-758F-08279EC75479}"/>
+                </a:ext>
+              </a:extLst>
+            </p:cNvPr>
+            <p:cNvCxnSpPr>
+              <a:cxnSpLocks/>
+              <a:stCxn id="21" idx="2"/>
+              <a:endCxn id="30" idx="0"/>
+            </p:cNvCxnSpPr>
+            <p:nvPr/>
+          </p:nvCxnSpPr>
+          <p:spPr>
+            <a:xfrm flipH="1">
+              <a:off x="6227790" y="1904743"/>
+              <a:ext cx="895580" cy="546185"/>
+            </a:xfrm>
+            <a:prstGeom prst="straightConnector1">
+              <a:avLst/>
+            </a:prstGeom>
+            <a:ln w="38100">
+              <a:tailEnd type="triangle"/>
+            </a:ln>
+          </p:spPr>
+          <p:style>
+            <a:lnRef idx="1">
+              <a:schemeClr val="accent1"/>
+            </a:lnRef>
+            <a:fillRef idx="0">
+              <a:schemeClr val="accent1"/>
+            </a:fillRef>
+            <a:effectRef idx="0">
+              <a:schemeClr val="accent1"/>
+            </a:effectRef>
+            <a:fontRef idx="minor">
+              <a:schemeClr val="tx1"/>
+            </a:fontRef>
+          </p:style>
+        </p:cxnSp>
+        <p:sp>
+          <p:nvSpPr>
+            <p:cNvPr id="63" name="Rounded Rectangle 62">
+              <a:extLst>
+                <a:ext uri="{FF2B5EF4-FFF2-40B4-BE49-F238E27FC236}">
+                  <a16:creationId xmlns:a16="http://schemas.microsoft.com/office/drawing/2014/main" id="{05E447BD-8264-E67E-975F-B309829D511E}"/>
+                </a:ext>
+              </a:extLst>
+            </p:cNvPr>
+            <p:cNvSpPr/>
+            <p:nvPr/>
+          </p:nvSpPr>
+          <p:spPr>
+            <a:xfrm>
+              <a:off x="3655440" y="4235737"/>
+              <a:ext cx="1451429" cy="584773"/>
+            </a:xfrm>
+            <a:prstGeom prst="roundRect">
+              <a:avLst/>
+            </a:prstGeom>
+            <a:solidFill>
+              <a:schemeClr val="bg1"/>
+            </a:solidFill>
+            <a:ln w="38100">
+              <a:solidFill>
+                <a:schemeClr val="tx1"/>
+              </a:solidFill>
+            </a:ln>
+          </p:spPr>
+          <p:style>
+            <a:lnRef idx="2">
+              <a:schemeClr val="accent1">
+                <a:shade val="50000"/>
+              </a:schemeClr>
+            </a:lnRef>
+            <a:fillRef idx="1">
+              <a:schemeClr val="accent1"/>
+            </a:fillRef>
+            <a:effectRef idx="0">
+              <a:schemeClr val="accent1"/>
+            </a:effectRef>
+            <a:fontRef idx="minor">
+              <a:schemeClr val="lt1"/>
+            </a:fontRef>
+          </p:style>
+          <p:txBody>
+            <a:bodyPr rtlCol="0" anchor="ctr"/>
+            <a:lstStyle/>
+            <a:p>
+              <a:pPr algn="ctr"/>
+              <a:r>
+                <a:rPr lang="en-US" sz="2000" dirty="0">
+                  <a:solidFill>
+                    <a:srgbClr val="FF0000"/>
+                  </a:solidFill>
+                </a:rPr>
+                <a:t>Timestamp</a:t>
+              </a:r>
+            </a:p>
+          </p:txBody>
+        </p:sp>
+        <p:cxnSp>
+          <p:nvCxnSpPr>
+            <p:cNvPr id="67" name="Straight Arrow Connector 66">
+              <a:extLst>
+                <a:ext uri="{FF2B5EF4-FFF2-40B4-BE49-F238E27FC236}">
+                  <a16:creationId xmlns:a16="http://schemas.microsoft.com/office/drawing/2014/main" id="{B9F1F9A5-767A-C93F-41E3-2A070D4DD57F}"/>
+                </a:ext>
+              </a:extLst>
+            </p:cNvPr>
+            <p:cNvCxnSpPr>
+              <a:cxnSpLocks/>
+              <a:stCxn id="63" idx="1"/>
+            </p:cNvCxnSpPr>
+            <p:nvPr/>
+          </p:nvCxnSpPr>
+          <p:spPr>
+            <a:xfrm flipH="1">
+              <a:off x="2119086" y="4528124"/>
+              <a:ext cx="1536354" cy="0"/>
+            </a:xfrm>
+            <a:prstGeom prst="straightConnector1">
+              <a:avLst/>
+            </a:prstGeom>
+            <a:ln w="38100">
+              <a:tailEnd type="triangle"/>
+            </a:ln>
+          </p:spPr>
+          <p:style>
+            <a:lnRef idx="1">
+              <a:schemeClr val="accent1"/>
+            </a:lnRef>
+            <a:fillRef idx="0">
+              <a:schemeClr val="accent1"/>
+            </a:fillRef>
+            <a:effectRef idx="0">
+              <a:schemeClr val="accent1"/>
+            </a:effectRef>
+            <a:fontRef idx="minor">
+              <a:schemeClr val="tx1"/>
+            </a:fontRef>
+          </p:style>
+        </p:cxnSp>
+        <p:sp>
+          <p:nvSpPr>
+            <p:cNvPr id="72" name="Rounded Rectangle 71">
+              <a:extLst>
+                <a:ext uri="{FF2B5EF4-FFF2-40B4-BE49-F238E27FC236}">
+                  <a16:creationId xmlns:a16="http://schemas.microsoft.com/office/drawing/2014/main" id="{CF6564B6-1DA9-49CB-F812-68A5177C9C6A}"/>
+                </a:ext>
+              </a:extLst>
+            </p:cNvPr>
+            <p:cNvSpPr/>
+            <p:nvPr/>
+          </p:nvSpPr>
+          <p:spPr>
+            <a:xfrm>
+              <a:off x="667657" y="981527"/>
+              <a:ext cx="1451429" cy="614360"/>
+            </a:xfrm>
+            <a:prstGeom prst="roundRect">
+              <a:avLst/>
+            </a:prstGeom>
+            <a:solidFill>
+              <a:schemeClr val="bg1"/>
+            </a:solidFill>
+            <a:ln w="38100">
+              <a:solidFill>
+                <a:schemeClr val="tx1"/>
+              </a:solidFill>
+            </a:ln>
+          </p:spPr>
+          <p:style>
+            <a:lnRef idx="2">
+              <a:schemeClr val="accent1">
+                <a:shade val="50000"/>
+              </a:schemeClr>
+            </a:lnRef>
+            <a:fillRef idx="1">
+              <a:schemeClr val="accent1"/>
+            </a:fillRef>
+            <a:effectRef idx="0">
+              <a:schemeClr val="accent1"/>
+            </a:effectRef>
+            <a:fontRef idx="minor">
+              <a:schemeClr val="lt1"/>
+            </a:fontRef>
+          </p:style>
+          <p:txBody>
+            <a:bodyPr rtlCol="0" anchor="ctr"/>
+            <a:lstStyle/>
+            <a:p>
+              <a:pPr algn="ctr"/>
+              <a:r>
+                <a:rPr lang="en-US" sz="2000" dirty="0">
+                  <a:solidFill>
+                    <a:srgbClr val="FF0000"/>
+                  </a:solidFill>
+                </a:rPr>
+                <a:t>Altitude</a:t>
+              </a:r>
+            </a:p>
+          </p:txBody>
+        </p:sp>
+        <p:cxnSp>
+          <p:nvCxnSpPr>
+            <p:cNvPr id="75" name="Straight Arrow Connector 74">
+              <a:extLst>
+                <a:ext uri="{FF2B5EF4-FFF2-40B4-BE49-F238E27FC236}">
+                  <a16:creationId xmlns:a16="http://schemas.microsoft.com/office/drawing/2014/main" id="{F57C7B34-518C-05B1-5E83-B21FD7105D6D}"/>
+                </a:ext>
+              </a:extLst>
+            </p:cNvPr>
+            <p:cNvCxnSpPr>
+              <a:cxnSpLocks/>
+              <a:stCxn id="72" idx="3"/>
+              <a:endCxn id="78" idx="1"/>
+            </p:cNvCxnSpPr>
+            <p:nvPr/>
+          </p:nvCxnSpPr>
+          <p:spPr>
+            <a:xfrm>
+              <a:off x="2119086" y="1288707"/>
+              <a:ext cx="1718792" cy="1"/>
+            </a:xfrm>
+            <a:prstGeom prst="straightConnector1">
+              <a:avLst/>
+            </a:prstGeom>
+            <a:ln w="38100">
+              <a:tailEnd type="triangle"/>
+            </a:ln>
+          </p:spPr>
+          <p:style>
+            <a:lnRef idx="1">
+              <a:schemeClr val="accent1"/>
+            </a:lnRef>
+            <a:fillRef idx="0">
+              <a:schemeClr val="accent1"/>
+            </a:fillRef>
+            <a:effectRef idx="0">
+              <a:schemeClr val="accent1"/>
+            </a:effectRef>
+            <a:fontRef idx="minor">
+              <a:schemeClr val="tx1"/>
+            </a:fontRef>
+          </p:style>
+        </p:cxnSp>
+        <p:sp>
+          <p:nvSpPr>
+            <p:cNvPr id="78" name="Rounded Rectangle 77">
+              <a:extLst>
+                <a:ext uri="{FF2B5EF4-FFF2-40B4-BE49-F238E27FC236}">
+                  <a16:creationId xmlns:a16="http://schemas.microsoft.com/office/drawing/2014/main" id="{D6C3CC3D-E383-038C-B6F8-927645A414F1}"/>
+                </a:ext>
+              </a:extLst>
+            </p:cNvPr>
+            <p:cNvSpPr/>
+            <p:nvPr/>
+          </p:nvSpPr>
+          <p:spPr>
+            <a:xfrm>
+              <a:off x="3837878" y="827937"/>
+              <a:ext cx="1659863" cy="921541"/>
+            </a:xfrm>
+            <a:prstGeom prst="roundRect">
+              <a:avLst/>
+            </a:prstGeom>
+            <a:solidFill>
+              <a:schemeClr val="bg1"/>
+            </a:solidFill>
+            <a:ln w="38100">
+              <a:solidFill>
+                <a:schemeClr val="tx1"/>
+              </a:solidFill>
+            </a:ln>
+          </p:spPr>
+          <p:style>
+            <a:lnRef idx="2">
+              <a:schemeClr val="accent1">
+                <a:shade val="50000"/>
+              </a:schemeClr>
+            </a:lnRef>
+            <a:fillRef idx="1">
+              <a:schemeClr val="accent1"/>
+            </a:fillRef>
+            <a:effectRef idx="0">
+              <a:schemeClr val="accent1"/>
+            </a:effectRef>
+            <a:fontRef idx="minor">
+              <a:schemeClr val="lt1"/>
+            </a:fontRef>
+          </p:style>
+          <p:txBody>
+            <a:bodyPr rtlCol="0" anchor="ctr"/>
+            <a:lstStyle/>
+            <a:p>
+              <a:pPr algn="ctr"/>
+              <a:r>
+                <a:rPr lang="en-US" sz="2000" dirty="0" err="1">
+                  <a:solidFill>
+                    <a:srgbClr val="FF0000"/>
+                  </a:solidFill>
+                </a:rPr>
+                <a:t>altitude.txt</a:t>
+              </a:r>
+              <a:endParaRPr lang="en-US" sz="2000" dirty="0">
+                <a:solidFill>
+                  <a:srgbClr val="FF0000"/>
+                </a:solidFill>
+              </a:endParaRPr>
+            </a:p>
+            <a:p>
+              <a:pPr algn="ctr"/>
+              <a:r>
+                <a:rPr lang="en-US" sz="1600" dirty="0">
+                  <a:solidFill>
+                    <a:schemeClr val="tx1"/>
+                  </a:solidFill>
+                </a:rPr>
+                <a:t>keeps note of current altitude </a:t>
+              </a:r>
+            </a:p>
+          </p:txBody>
+        </p:sp>
+        <p:cxnSp>
+          <p:nvCxnSpPr>
+            <p:cNvPr id="95" name="Straight Arrow Connector 94">
+              <a:extLst>
+                <a:ext uri="{FF2B5EF4-FFF2-40B4-BE49-F238E27FC236}">
+                  <a16:creationId xmlns:a16="http://schemas.microsoft.com/office/drawing/2014/main" id="{47E60619-8BDE-1427-5E7F-90F8F2E1F619}"/>
+                </a:ext>
+              </a:extLst>
+            </p:cNvPr>
+            <p:cNvCxnSpPr>
+              <a:cxnSpLocks/>
+              <a:stCxn id="78" idx="2"/>
+              <a:endCxn id="30" idx="0"/>
+            </p:cNvCxnSpPr>
+            <p:nvPr/>
+          </p:nvCxnSpPr>
+          <p:spPr>
+            <a:xfrm>
+              <a:off x="4667810" y="1749478"/>
+              <a:ext cx="1559980" cy="701450"/>
+            </a:xfrm>
+            <a:prstGeom prst="straightConnector1">
+              <a:avLst/>
+            </a:prstGeom>
+            <a:ln w="38100">
+              <a:tailEnd type="triangle"/>
+            </a:ln>
+          </p:spPr>
+          <p:style>
+            <a:lnRef idx="1">
+              <a:schemeClr val="accent1"/>
+            </a:lnRef>
+            <a:fillRef idx="0">
+              <a:schemeClr val="accent1"/>
+            </a:fillRef>
+            <a:effectRef idx="0">
+              <a:schemeClr val="accent1"/>
+            </a:effectRef>
+            <a:fontRef idx="minor">
+              <a:schemeClr val="tx1"/>
+            </a:fontRef>
+          </p:style>
+        </p:cxnSp>
+      </p:grpSp>
+    </p:spTree>
+    <p:extLst>
+      <p:ext uri="{BB962C8B-B14F-4D97-AF65-F5344CB8AC3E}">
+        <p14:creationId xmlns:p14="http://schemas.microsoft.com/office/powerpoint/2010/main" val="2130156074"/>
       </p:ext>
     </p:extLst>
   </p:cSld>

</xml_diff>